<commit_message>
use print_r as echo to display twig
</commit_message>
<xml_diff>
--- a/Présentation_du_projet.pptx
+++ b/Présentation_du_projet.pptx
@@ -200,7 +200,7 @@
           <a:p>
             <a:fld id="{4413CF0D-7A1D-4467-AF9E-15951AC1487E}" type="datetimeFigureOut">
               <a:rPr lang="fr-FR" smtClean="0"/>
-              <a:t>21/08/2020</a:t>
+              <a:t>09/09/2020</a:t>
             </a:fld>
             <a:endParaRPr lang="fr-FR"/>
           </a:p>
@@ -1054,7 +1054,7 @@
           <a:p>
             <a:fld id="{2D986C9A-046A-462A-B758-E10424DD7DFF}" type="datetimeFigureOut">
               <a:rPr lang="fr-FR" smtClean="0"/>
-              <a:t>21/08/2020</a:t>
+              <a:t>09/09/2020</a:t>
             </a:fld>
             <a:endParaRPr lang="fr-FR"/>
           </a:p>
@@ -1350,7 +1350,7 @@
           <a:p>
             <a:fld id="{2D986C9A-046A-462A-B758-E10424DD7DFF}" type="datetimeFigureOut">
               <a:rPr lang="fr-FR" smtClean="0"/>
-              <a:t>21/08/2020</a:t>
+              <a:t>09/09/2020</a:t>
             </a:fld>
             <a:endParaRPr lang="fr-FR"/>
           </a:p>
@@ -1598,7 +1598,7 @@
           <a:p>
             <a:fld id="{2D986C9A-046A-462A-B758-E10424DD7DFF}" type="datetimeFigureOut">
               <a:rPr lang="fr-FR" smtClean="0"/>
-              <a:t>21/08/2020</a:t>
+              <a:t>09/09/2020</a:t>
             </a:fld>
             <a:endParaRPr lang="fr-FR"/>
           </a:p>
@@ -2138,7 +2138,7 @@
           <a:p>
             <a:fld id="{2D986C9A-046A-462A-B758-E10424DD7DFF}" type="datetimeFigureOut">
               <a:rPr lang="fr-FR" smtClean="0"/>
-              <a:t>21/08/2020</a:t>
+              <a:t>09/09/2020</a:t>
             </a:fld>
             <a:endParaRPr lang="fr-FR"/>
           </a:p>
@@ -2386,7 +2386,7 @@
           <a:p>
             <a:fld id="{2D986C9A-046A-462A-B758-E10424DD7DFF}" type="datetimeFigureOut">
               <a:rPr lang="fr-FR" smtClean="0"/>
-              <a:t>21/08/2020</a:t>
+              <a:t>09/09/2020</a:t>
             </a:fld>
             <a:endParaRPr lang="fr-FR"/>
           </a:p>
@@ -2918,7 +2918,7 @@
           <a:p>
             <a:fld id="{2D986C9A-046A-462A-B758-E10424DD7DFF}" type="datetimeFigureOut">
               <a:rPr lang="fr-FR" smtClean="0"/>
-              <a:t>21/08/2020</a:t>
+              <a:t>09/09/2020</a:t>
             </a:fld>
             <a:endParaRPr lang="fr-FR"/>
           </a:p>
@@ -3215,7 +3215,7 @@
           <a:p>
             <a:fld id="{2D986C9A-046A-462A-B758-E10424DD7DFF}" type="datetimeFigureOut">
               <a:rPr lang="fr-FR" smtClean="0"/>
-              <a:t>21/08/2020</a:t>
+              <a:t>09/09/2020</a:t>
             </a:fld>
             <a:endParaRPr lang="fr-FR"/>
           </a:p>
@@ -3389,7 +3389,7 @@
           <a:p>
             <a:fld id="{2D986C9A-046A-462A-B758-E10424DD7DFF}" type="datetimeFigureOut">
               <a:rPr lang="fr-FR" smtClean="0"/>
-              <a:t>21/08/2020</a:t>
+              <a:t>09/09/2020</a:t>
             </a:fld>
             <a:endParaRPr lang="fr-FR"/>
           </a:p>
@@ -3569,7 +3569,7 @@
           <a:p>
             <a:fld id="{2D986C9A-046A-462A-B758-E10424DD7DFF}" type="datetimeFigureOut">
               <a:rPr lang="fr-FR" smtClean="0"/>
-              <a:t>21/08/2020</a:t>
+              <a:t>09/09/2020</a:t>
             </a:fld>
             <a:endParaRPr lang="fr-FR"/>
           </a:p>
@@ -3780,7 +3780,7 @@
           <a:p>
             <a:fld id="{2D986C9A-046A-462A-B758-E10424DD7DFF}" type="datetimeFigureOut">
               <a:rPr lang="fr-FR" smtClean="0"/>
-              <a:t>21/08/2020</a:t>
+              <a:t>09/09/2020</a:t>
             </a:fld>
             <a:endParaRPr lang="fr-FR"/>
           </a:p>
@@ -4031,7 +4031,7 @@
           <a:p>
             <a:fld id="{2D986C9A-046A-462A-B758-E10424DD7DFF}" type="datetimeFigureOut">
               <a:rPr lang="fr-FR" smtClean="0"/>
-              <a:t>21/08/2020</a:t>
+              <a:t>09/09/2020</a:t>
             </a:fld>
             <a:endParaRPr lang="fr-FR"/>
           </a:p>
@@ -4378,7 +4378,7 @@
           <a:p>
             <a:fld id="{2D986C9A-046A-462A-B758-E10424DD7DFF}" type="datetimeFigureOut">
               <a:rPr lang="fr-FR" smtClean="0"/>
-              <a:t>21/08/2020</a:t>
+              <a:t>09/09/2020</a:t>
             </a:fld>
             <a:endParaRPr lang="fr-FR"/>
           </a:p>
@@ -4870,7 +4870,7 @@
           <a:p>
             <a:fld id="{2D986C9A-046A-462A-B758-E10424DD7DFF}" type="datetimeFigureOut">
               <a:rPr lang="fr-FR" smtClean="0"/>
-              <a:t>21/08/2020</a:t>
+              <a:t>09/09/2020</a:t>
             </a:fld>
             <a:endParaRPr lang="fr-FR"/>
           </a:p>
@@ -4988,7 +4988,7 @@
           <a:p>
             <a:fld id="{2D986C9A-046A-462A-B758-E10424DD7DFF}" type="datetimeFigureOut">
               <a:rPr lang="fr-FR" smtClean="0"/>
-              <a:t>21/08/2020</a:t>
+              <a:t>09/09/2020</a:t>
             </a:fld>
             <a:endParaRPr lang="fr-FR"/>
           </a:p>
@@ -5083,7 +5083,7 @@
           <a:p>
             <a:fld id="{2D986C9A-046A-462A-B758-E10424DD7DFF}" type="datetimeFigureOut">
               <a:rPr lang="fr-FR" smtClean="0"/>
-              <a:t>21/08/2020</a:t>
+              <a:t>09/09/2020</a:t>
             </a:fld>
             <a:endParaRPr lang="fr-FR"/>
           </a:p>
@@ -5366,7 +5366,7 @@
           <a:p>
             <a:fld id="{2D986C9A-046A-462A-B758-E10424DD7DFF}" type="datetimeFigureOut">
               <a:rPr lang="fr-FR" smtClean="0"/>
-              <a:t>21/08/2020</a:t>
+              <a:t>09/09/2020</a:t>
             </a:fld>
             <a:endParaRPr lang="fr-FR"/>
           </a:p>
@@ -5657,7 +5657,7 @@
           <a:p>
             <a:fld id="{2D986C9A-046A-462A-B758-E10424DD7DFF}" type="datetimeFigureOut">
               <a:rPr lang="fr-FR" smtClean="0"/>
-              <a:t>21/08/2020</a:t>
+              <a:t>09/09/2020</a:t>
             </a:fld>
             <a:endParaRPr lang="fr-FR"/>
           </a:p>
@@ -6187,7 +6187,7 @@
           <a:p>
             <a:fld id="{2D986C9A-046A-462A-B758-E10424DD7DFF}" type="datetimeFigureOut">
               <a:rPr lang="fr-FR" smtClean="0"/>
-              <a:t>21/08/2020</a:t>
+              <a:t>09/09/2020</a:t>
             </a:fld>
             <a:endParaRPr lang="fr-FR"/>
           </a:p>
@@ -6734,10 +6734,58 @@
           <a:lstStyle/>
           <a:p>
             <a:r>
-              <a:rPr lang="fr-FR" dirty="0" smtClean="0"/>
-              <a:t>BLOG de Jessy-BROS</a:t>
-            </a:r>
-            <a:endParaRPr lang="fr-FR" dirty="0"/>
+              <a:rPr lang="fr-FR" dirty="0" smtClean="0">
+                <a:solidFill>
+                  <a:schemeClr val="bg2">
+                    <a:lumMod val="50000"/>
+                  </a:schemeClr>
+                </a:solidFill>
+              </a:rPr>
+              <a:t>BLOG de </a:t>
+            </a:r>
+            <a:r>
+              <a:rPr lang="fr-FR" dirty="0" smtClean="0">
+                <a:solidFill>
+                  <a:schemeClr val="accent1"/>
+                </a:solidFill>
+              </a:rPr>
+              <a:t>J</a:t>
+            </a:r>
+            <a:r>
+              <a:rPr lang="fr-FR" dirty="0" smtClean="0">
+                <a:solidFill>
+                  <a:schemeClr val="bg2">
+                    <a:lumMod val="50000"/>
+                  </a:schemeClr>
+                </a:solidFill>
+              </a:rPr>
+              <a:t>essy-</a:t>
+            </a:r>
+            <a:r>
+              <a:rPr lang="fr-FR" dirty="0" smtClean="0">
+                <a:solidFill>
+                  <a:schemeClr val="accent1"/>
+                </a:solidFill>
+              </a:rPr>
+              <a:t>B</a:t>
+            </a:r>
+            <a:r>
+              <a:rPr lang="fr-FR" dirty="0" smtClean="0">
+                <a:solidFill>
+                  <a:schemeClr val="bg2">
+                    <a:lumMod val="50000"/>
+                  </a:schemeClr>
+                </a:solidFill>
+              </a:rPr>
+              <a:t>ROS</a:t>
+            </a:r>
+            <a:endParaRPr lang="fr-FR" dirty="0">
+              <a:solidFill>
+                <a:schemeClr val="bg2">
+                  <a:lumMod val="50000"/>
+                </a:schemeClr>
+              </a:solidFill>
+            </a:endParaRPr>
           </a:p>
         </p:txBody>
       </p:sp>
@@ -6757,14 +6805,35 @@
           <a:lstStyle/>
           <a:p>
             <a:r>
-              <a:rPr lang="fr-FR" dirty="0" smtClean="0"/>
+              <a:rPr lang="fr-FR" dirty="0" smtClean="0">
+                <a:solidFill>
+                  <a:schemeClr val="tx1">
+                    <a:lumMod val="65000"/>
+                    <a:lumOff val="35000"/>
+                  </a:schemeClr>
+                </a:solidFill>
+              </a:rPr>
               <a:t>Développement d’application </a:t>
             </a:r>
             <a:r>
-              <a:rPr lang="fr-FR" dirty="0" err="1" smtClean="0"/>
+              <a:rPr lang="fr-FR" dirty="0" err="1" smtClean="0">
+                <a:solidFill>
+                  <a:schemeClr val="tx1">
+                    <a:lumMod val="65000"/>
+                    <a:lumOff val="35000"/>
+                  </a:schemeClr>
+                </a:solidFill>
+              </a:rPr>
               <a:t>php</a:t>
             </a:r>
-            <a:endParaRPr lang="fr-FR" dirty="0"/>
+            <a:endParaRPr lang="fr-FR" dirty="0">
+              <a:solidFill>
+                <a:schemeClr val="tx1">
+                  <a:lumMod val="65000"/>
+                  <a:lumOff val="35000"/>
+                </a:schemeClr>
+              </a:solidFill>
+            </a:endParaRPr>
           </a:p>
         </p:txBody>
       </p:sp>
@@ -6821,10 +6890,28 @@
           <a:lstStyle/>
           <a:p>
             <a:r>
-              <a:rPr lang="fr-FR" dirty="0" smtClean="0"/>
-              <a:t>Sommaire</a:t>
-            </a:r>
-            <a:endParaRPr lang="fr-FR" dirty="0"/>
+              <a:rPr lang="fr-FR" u="sng" dirty="0" smtClean="0">
+                <a:solidFill>
+                  <a:schemeClr val="bg2">
+                    <a:lumMod val="50000"/>
+                  </a:schemeClr>
+                </a:solidFill>
+              </a:rPr>
+              <a:t>S</a:t>
+            </a:r>
+            <a:r>
+              <a:rPr lang="fr-FR" u="sng" dirty="0" smtClean="0">
+                <a:solidFill>
+                  <a:schemeClr val="accent1"/>
+                </a:solidFill>
+              </a:rPr>
+              <a:t>ommaire</a:t>
+            </a:r>
+            <a:endParaRPr lang="fr-FR" u="sng" dirty="0">
+              <a:solidFill>
+                <a:schemeClr val="accent1"/>
+              </a:solidFill>
+            </a:endParaRPr>
           </a:p>
         </p:txBody>
       </p:sp>
@@ -6846,7 +6933,7 @@
         </p:spPr>
         <p:txBody>
           <a:bodyPr>
-            <a:normAutofit fontScale="77500" lnSpcReduction="20000"/>
+            <a:normAutofit fontScale="85000" lnSpcReduction="20000"/>
           </a:bodyPr>
           <a:lstStyle/>
           <a:p>
@@ -6855,85 +6942,235 @@
               <a:buAutoNum type="arabicPeriod"/>
             </a:pPr>
             <a:r>
-              <a:rPr lang="fr-FR" b="1" u="sng" dirty="0" smtClean="0"/>
-              <a:t>Présentation du contexte du projet, analyse du besoin &amp; organisation du projet</a:t>
+              <a:rPr lang="fr-FR" sz="2500" b="1" dirty="0">
+                <a:solidFill>
+                  <a:schemeClr val="bg2">
+                    <a:lumMod val="50000"/>
+                  </a:schemeClr>
+                </a:solidFill>
+                <a:effectLst>
+                  <a:outerShdw blurRad="38100" dist="38100" dir="2700000" algn="tl">
+                    <a:srgbClr val="000000">
+                      <a:alpha val="43137"/>
+                    </a:srgbClr>
+                  </a:outerShdw>
+                </a:effectLst>
+              </a:rPr>
+              <a:t>P</a:t>
+            </a:r>
+            <a:r>
+              <a:rPr lang="fr-FR" sz="2500" b="1" dirty="0">
+                <a:solidFill>
+                  <a:schemeClr val="accent1"/>
+                </a:solidFill>
+                <a:effectLst>
+                  <a:outerShdw blurRad="38100" dist="38100" dir="2700000" algn="tl">
+                    <a:srgbClr val="000000">
+                      <a:alpha val="43137"/>
+                    </a:srgbClr>
+                  </a:outerShdw>
+                </a:effectLst>
+              </a:rPr>
+              <a:t>résentation du contexte du projet, analyse du besoin &amp; organisation du projet</a:t>
             </a:r>
             <a:br>
-              <a:rPr lang="fr-FR" b="1" u="sng" dirty="0" smtClean="0"/>
+              <a:rPr lang="fr-FR" sz="2500" b="1" dirty="0">
+                <a:solidFill>
+                  <a:schemeClr val="accent1"/>
+                </a:solidFill>
+                <a:effectLst>
+                  <a:outerShdw blurRad="38100" dist="38100" dir="2700000" algn="tl">
+                    <a:srgbClr val="000000">
+                      <a:alpha val="43137"/>
+                    </a:srgbClr>
+                  </a:outerShdw>
+                </a:effectLst>
+              </a:rPr>
             </a:br>
             <a:r>
-              <a:rPr lang="fr-FR" b="1" u="sng" dirty="0" smtClean="0"/>
+              <a:rPr lang="fr-FR" sz="2500" dirty="0">
+                <a:solidFill>
+                  <a:schemeClr val="bg2">
+                    <a:lumMod val="50000"/>
+                  </a:schemeClr>
+                </a:solidFill>
+                <a:effectLst>
+                  <a:outerShdw blurRad="38100" dist="38100" dir="2700000" algn="tl">
+                    <a:srgbClr val="000000">
+                      <a:alpha val="43137"/>
+                    </a:srgbClr>
+                  </a:outerShdw>
+                </a:effectLst>
+              </a:rPr>
               <a:t/>
             </a:r>
             <a:br>
-              <a:rPr lang="fr-FR" b="1" u="sng" dirty="0" smtClean="0"/>
+              <a:rPr lang="fr-FR" sz="2500" dirty="0">
+                <a:solidFill>
+                  <a:schemeClr val="bg2">
+                    <a:lumMod val="50000"/>
+                  </a:schemeClr>
+                </a:solidFill>
+                <a:effectLst>
+                  <a:outerShdw blurRad="38100" dist="38100" dir="2700000" algn="tl">
+                    <a:srgbClr val="000000">
+                      <a:alpha val="43137"/>
+                    </a:srgbClr>
+                  </a:outerShdw>
+                </a:effectLst>
+              </a:rPr>
             </a:br>
             <a:r>
-              <a:rPr lang="fr-FR" b="1" dirty="0" smtClean="0"/>
+              <a:rPr lang="fr-FR" sz="2100" dirty="0" smtClean="0">
+                <a:solidFill>
+                  <a:schemeClr val="bg2">
+                    <a:lumMod val="50000"/>
+                  </a:schemeClr>
+                </a:solidFill>
+              </a:rPr>
               <a:t>• Présentation </a:t>
             </a:r>
             <a:r>
-              <a:rPr lang="fr-FR" b="1" dirty="0"/>
+              <a:rPr lang="fr-FR" sz="2100" dirty="0">
+                <a:solidFill>
+                  <a:schemeClr val="bg2">
+                    <a:lumMod val="50000"/>
+                  </a:schemeClr>
+                </a:solidFill>
+              </a:rPr>
               <a:t>du contexte du projet </a:t>
             </a:r>
             <a:r>
-              <a:rPr lang="fr-FR" b="1" dirty="0" smtClean="0"/>
+              <a:rPr lang="fr-FR" sz="2100" dirty="0" smtClean="0">
+                <a:solidFill>
+                  <a:schemeClr val="bg2">
+                    <a:lumMod val="50000"/>
+                  </a:schemeClr>
+                </a:solidFill>
+              </a:rPr>
               <a:t/>
             </a:r>
             <a:br>
-              <a:rPr lang="fr-FR" b="1" dirty="0" smtClean="0"/>
+              <a:rPr lang="fr-FR" sz="2100" dirty="0" smtClean="0">
+                <a:solidFill>
+                  <a:schemeClr val="bg2">
+                    <a:lumMod val="50000"/>
+                  </a:schemeClr>
+                </a:solidFill>
+              </a:rPr>
             </a:br>
             <a:r>
-              <a:rPr lang="fr-FR" dirty="0" smtClean="0"/>
-              <a:t>• </a:t>
-            </a:r>
-            <a:r>
-              <a:rPr lang="fr-FR" b="1" dirty="0" smtClean="0"/>
-              <a:t>Analyse </a:t>
-            </a:r>
-            <a:r>
-              <a:rPr lang="fr-FR" b="1" dirty="0"/>
+              <a:rPr lang="fr-FR" sz="2100" dirty="0" smtClean="0">
+                <a:solidFill>
+                  <a:schemeClr val="bg2">
+                    <a:lumMod val="50000"/>
+                  </a:schemeClr>
+                </a:solidFill>
+              </a:rPr>
+              <a:t>• Analyse </a:t>
+            </a:r>
+            <a:r>
+              <a:rPr lang="fr-FR" sz="2100" dirty="0">
+                <a:solidFill>
+                  <a:schemeClr val="bg2">
+                    <a:lumMod val="50000"/>
+                  </a:schemeClr>
+                </a:solidFill>
+              </a:rPr>
               <a:t>du besoin </a:t>
             </a:r>
             <a:r>
-              <a:rPr lang="fr-FR" b="1" dirty="0" smtClean="0"/>
+              <a:rPr lang="fr-FR" sz="2100" dirty="0" smtClean="0">
+                <a:solidFill>
+                  <a:schemeClr val="bg2">
+                    <a:lumMod val="50000"/>
+                  </a:schemeClr>
+                </a:solidFill>
+              </a:rPr>
               <a:t>: </a:t>
             </a:r>
             <a:r>
-              <a:rPr lang="fr-FR" dirty="0"/>
+              <a:rPr lang="fr-FR" sz="2100" dirty="0">
+                <a:solidFill>
+                  <a:schemeClr val="bg2">
+                    <a:lumMod val="50000"/>
+                  </a:schemeClr>
+                </a:solidFill>
+              </a:rPr>
               <a:t> </a:t>
             </a:r>
             <a:r>
-              <a:rPr lang="fr-FR" dirty="0" smtClean="0"/>
+              <a:rPr lang="fr-FR" sz="2100" dirty="0" smtClean="0">
+                <a:solidFill>
+                  <a:schemeClr val="bg2">
+                    <a:lumMod val="50000"/>
+                  </a:schemeClr>
+                </a:solidFill>
+              </a:rPr>
               <a:t>Une fonctionnalité et présentation UML de celui-ci</a:t>
             </a:r>
             <a:br>
-              <a:rPr lang="fr-FR" dirty="0" smtClean="0"/>
+              <a:rPr lang="fr-FR" sz="2100" dirty="0" smtClean="0">
+                <a:solidFill>
+                  <a:schemeClr val="bg2">
+                    <a:lumMod val="50000"/>
+                  </a:schemeClr>
+                </a:solidFill>
+              </a:rPr>
             </a:br>
             <a:r>
-              <a:rPr lang="fr-FR" dirty="0" smtClean="0"/>
-              <a:t>• </a:t>
-            </a:r>
-            <a:r>
-              <a:rPr lang="fr-FR" b="1" dirty="0" smtClean="0"/>
-              <a:t>Organisation </a:t>
-            </a:r>
-            <a:r>
-              <a:rPr lang="fr-FR" b="1" dirty="0"/>
+              <a:rPr lang="fr-FR" sz="2100" dirty="0" smtClean="0">
+                <a:solidFill>
+                  <a:schemeClr val="bg2">
+                    <a:lumMod val="50000"/>
+                  </a:schemeClr>
+                </a:solidFill>
+              </a:rPr>
+              <a:t>• Organisation </a:t>
+            </a:r>
+            <a:r>
+              <a:rPr lang="fr-FR" sz="2100" dirty="0">
+                <a:solidFill>
+                  <a:schemeClr val="bg2">
+                    <a:lumMod val="50000"/>
+                  </a:schemeClr>
+                </a:solidFill>
+              </a:rPr>
               <a:t>du </a:t>
             </a:r>
             <a:r>
-              <a:rPr lang="fr-FR" b="1" dirty="0" smtClean="0"/>
+              <a:rPr lang="fr-FR" sz="2100" dirty="0" smtClean="0">
+                <a:solidFill>
+                  <a:schemeClr val="bg2">
+                    <a:lumMod val="50000"/>
+                  </a:schemeClr>
+                </a:solidFill>
+              </a:rPr>
               <a:t>projet</a:t>
             </a:r>
-            <a:r>
-              <a:rPr lang="fr-FR" dirty="0" smtClean="0"/>
-              <a:t/>
-            </a:r>
             <a:br>
-              <a:rPr lang="fr-FR" dirty="0" smtClean="0"/>
+              <a:rPr lang="fr-FR" sz="2100" dirty="0" smtClean="0">
+                <a:solidFill>
+                  <a:schemeClr val="bg2">
+                    <a:lumMod val="50000"/>
+                  </a:schemeClr>
+                </a:solidFill>
+              </a:rPr>
             </a:br>
-            <a:endParaRPr lang="fr-FR" dirty="0" smtClean="0"/>
+            <a:endParaRPr lang="fr-FR" sz="2100" dirty="0" smtClean="0">
+              <a:solidFill>
+                <a:schemeClr val="bg2">
+                  <a:lumMod val="50000"/>
+                </a:schemeClr>
+              </a:solidFill>
+              <a:effectLst>
+                <a:outerShdw blurRad="38100" dist="38100" dir="2700000" algn="tl">
+                  <a:srgbClr val="000000">
+                    <a:alpha val="43137"/>
+                  </a:srgbClr>
+                </a:outerShdw>
+              </a:effectLst>
+            </a:endParaRPr>
           </a:p>
           <a:p>
             <a:pPr marL="457200" indent="-457200">
@@ -6941,25 +7178,88 @@
               <a:buAutoNum type="arabicPeriod"/>
             </a:pPr>
             <a:r>
-              <a:rPr lang="fr-FR" b="1" u="sng" dirty="0" smtClean="0"/>
-              <a:t>Démonstration </a:t>
-            </a:r>
-            <a:r>
-              <a:rPr lang="fr-FR" b="1" u="sng" dirty="0"/>
+              <a:rPr lang="fr-FR" b="1" dirty="0" smtClean="0">
+                <a:solidFill>
+                  <a:schemeClr val="tx2">
+                    <a:lumMod val="75000"/>
+                    <a:lumOff val="25000"/>
+                  </a:schemeClr>
+                </a:solidFill>
+                <a:effectLst>
+                  <a:outerShdw blurRad="38100" dist="38100" dir="2700000" algn="tl">
+                    <a:srgbClr val="000000">
+                      <a:alpha val="43137"/>
+                    </a:srgbClr>
+                  </a:outerShdw>
+                </a:effectLst>
+              </a:rPr>
+              <a:t>D</a:t>
+            </a:r>
+            <a:r>
+              <a:rPr lang="fr-FR" b="1" dirty="0" smtClean="0">
+                <a:solidFill>
+                  <a:schemeClr val="accent1"/>
+                </a:solidFill>
+                <a:effectLst>
+                  <a:outerShdw blurRad="38100" dist="38100" dir="2700000" algn="tl">
+                    <a:srgbClr val="000000">
+                      <a:alpha val="43137"/>
+                    </a:srgbClr>
+                  </a:outerShdw>
+                </a:effectLst>
+              </a:rPr>
+              <a:t>émonstration </a:t>
+            </a:r>
+            <a:r>
+              <a:rPr lang="fr-FR" b="1" dirty="0">
+                <a:solidFill>
+                  <a:schemeClr val="accent1"/>
+                </a:solidFill>
+                <a:effectLst>
+                  <a:outerShdw blurRad="38100" dist="38100" dir="2700000" algn="tl">
+                    <a:srgbClr val="000000">
+                      <a:alpha val="43137"/>
+                    </a:srgbClr>
+                  </a:outerShdw>
+                </a:effectLst>
+              </a:rPr>
               <a:t>de </a:t>
             </a:r>
             <a:r>
-              <a:rPr lang="fr-FR" b="1" u="sng" dirty="0" smtClean="0"/>
+              <a:rPr lang="fr-FR" b="1" dirty="0" smtClean="0">
+                <a:solidFill>
+                  <a:schemeClr val="accent1"/>
+                </a:solidFill>
+                <a:effectLst>
+                  <a:outerShdw blurRad="38100" dist="38100" dir="2700000" algn="tl">
+                    <a:srgbClr val="000000">
+                      <a:alpha val="43137"/>
+                    </a:srgbClr>
+                  </a:outerShdw>
+                </a:effectLst>
+              </a:rPr>
               <a:t>l'application</a:t>
             </a:r>
             <a:r>
-              <a:rPr lang="fr-FR" dirty="0" smtClean="0"/>
+              <a:rPr lang="fr-FR" dirty="0" smtClean="0">
+                <a:solidFill>
+                  <a:schemeClr val="accent1"/>
+                </a:solidFill>
+              </a:rPr>
               <a:t/>
             </a:r>
             <a:br>
-              <a:rPr lang="fr-FR" dirty="0" smtClean="0"/>
+              <a:rPr lang="fr-FR" dirty="0" smtClean="0">
+                <a:solidFill>
+                  <a:schemeClr val="accent1"/>
+                </a:solidFill>
+              </a:rPr>
             </a:br>
-            <a:endParaRPr lang="fr-FR" dirty="0" smtClean="0"/>
+            <a:endParaRPr lang="fr-FR" dirty="0" smtClean="0">
+              <a:solidFill>
+                <a:schemeClr val="accent1"/>
+              </a:solidFill>
+            </a:endParaRPr>
           </a:p>
           <a:p>
             <a:pPr marL="457200" indent="-457200">
@@ -6967,135 +7267,394 @@
               <a:buAutoNum type="arabicPeriod"/>
             </a:pPr>
             <a:r>
-              <a:rPr lang="fr-FR" b="1" u="sng" dirty="0" smtClean="0"/>
-              <a:t>Exécution. </a:t>
-            </a:r>
-            <a:r>
-              <a:rPr lang="fr-FR" b="1" dirty="0" smtClean="0"/>
-              <a:t>Vous présenterez le projet du point de vue technique cette fois-ci. Il s'agit de :</a:t>
+              <a:rPr lang="fr-FR" sz="2500" b="1" dirty="0">
+                <a:solidFill>
+                  <a:schemeClr val="tx2">
+                    <a:lumMod val="75000"/>
+                    <a:lumOff val="25000"/>
+                  </a:schemeClr>
+                </a:solidFill>
+                <a:effectLst>
+                  <a:outerShdw blurRad="38100" dist="38100" dir="2700000" algn="tl">
+                    <a:srgbClr val="000000">
+                      <a:alpha val="43137"/>
+                    </a:srgbClr>
+                  </a:outerShdw>
+                </a:effectLst>
+              </a:rPr>
+              <a:t>P</a:t>
+            </a:r>
+            <a:r>
+              <a:rPr lang="fr-FR" sz="2500" b="1" dirty="0">
+                <a:solidFill>
+                  <a:schemeClr val="accent1"/>
+                </a:solidFill>
+                <a:effectLst>
+                  <a:outerShdw blurRad="38100" dist="38100" dir="2700000" algn="tl">
+                    <a:srgbClr val="000000">
+                      <a:alpha val="43137"/>
+                    </a:srgbClr>
+                  </a:outerShdw>
+                </a:effectLst>
+              </a:rPr>
+              <a:t>résentation </a:t>
+            </a:r>
+            <a:r>
+              <a:rPr lang="fr-FR" sz="2500" b="1" dirty="0" smtClean="0">
+                <a:solidFill>
+                  <a:schemeClr val="accent1"/>
+                </a:solidFill>
+                <a:effectLst>
+                  <a:outerShdw blurRad="38100" dist="38100" dir="2700000" algn="tl">
+                    <a:srgbClr val="000000">
+                      <a:alpha val="43137"/>
+                    </a:srgbClr>
+                  </a:outerShdw>
+                </a:effectLst>
+              </a:rPr>
+              <a:t>technique </a:t>
+            </a:r>
+            <a:r>
+              <a:rPr lang="fr-FR" sz="2500" b="1" dirty="0">
+                <a:solidFill>
+                  <a:schemeClr val="accent1"/>
+                </a:solidFill>
+                <a:effectLst>
+                  <a:outerShdw blurRad="38100" dist="38100" dir="2700000" algn="tl">
+                    <a:srgbClr val="000000">
+                      <a:alpha val="43137"/>
+                    </a:srgbClr>
+                  </a:outerShdw>
+                </a:effectLst>
+              </a:rPr>
+              <a:t>du projet </a:t>
+            </a:r>
+            <a:r>
+              <a:rPr lang="fr-FR" b="1" dirty="0" smtClean="0">
+                <a:solidFill>
+                  <a:schemeClr val="accent1"/>
+                </a:solidFill>
+              </a:rPr>
+              <a:t/>
             </a:r>
             <a:br>
-              <a:rPr lang="fr-FR" b="1" dirty="0" smtClean="0"/>
+              <a:rPr lang="fr-FR" b="1" dirty="0" smtClean="0">
+                <a:solidFill>
+                  <a:schemeClr val="accent1"/>
+                </a:solidFill>
+              </a:rPr>
             </a:br>
             <a:r>
-              <a:rPr lang="fr-FR" b="1" dirty="0" smtClean="0"/>
+              <a:rPr lang="fr-FR" sz="2100" b="1" dirty="0" smtClean="0">
+                <a:solidFill>
+                  <a:schemeClr val="bg2">
+                    <a:lumMod val="50000"/>
+                  </a:schemeClr>
+                </a:solidFill>
+              </a:rPr>
               <a:t/>
             </a:r>
             <a:br>
-              <a:rPr lang="fr-FR" b="1" dirty="0" smtClean="0"/>
+              <a:rPr lang="fr-FR" sz="2100" b="1" dirty="0" smtClean="0">
+                <a:solidFill>
+                  <a:schemeClr val="bg2">
+                    <a:lumMod val="50000"/>
+                  </a:schemeClr>
+                </a:solidFill>
+              </a:rPr>
             </a:br>
             <a:r>
-              <a:rPr lang="fr-FR" b="1" dirty="0" smtClean="0"/>
+              <a:rPr lang="fr-FR" sz="2100" b="1" dirty="0" smtClean="0">
+                <a:solidFill>
+                  <a:schemeClr val="bg2">
+                    <a:lumMod val="50000"/>
+                  </a:schemeClr>
+                </a:solidFill>
+              </a:rPr>
               <a:t>•</a:t>
             </a:r>
             <a:r>
-              <a:rPr lang="fr-FR" b="1" u="sng" dirty="0" smtClean="0"/>
+              <a:rPr lang="fr-FR" sz="2100" b="1" u="sng" dirty="0" smtClean="0">
+                <a:solidFill>
+                  <a:schemeClr val="bg2">
+                    <a:lumMod val="50000"/>
+                  </a:schemeClr>
+                </a:solidFill>
+              </a:rPr>
               <a:t> </a:t>
             </a:r>
             <a:r>
-              <a:rPr lang="fr-FR" dirty="0" err="1" smtClean="0"/>
+              <a:rPr lang="fr-FR" sz="2100" dirty="0" err="1" smtClean="0">
+                <a:solidFill>
+                  <a:schemeClr val="bg2">
+                    <a:lumMod val="50000"/>
+                  </a:schemeClr>
+                </a:solidFill>
+              </a:rPr>
               <a:t>Versionnage</a:t>
             </a:r>
             <a:r>
-              <a:rPr lang="fr-FR" dirty="0" smtClean="0"/>
+              <a:rPr lang="fr-FR" sz="2100" dirty="0" smtClean="0">
+                <a:solidFill>
+                  <a:schemeClr val="bg2">
+                    <a:lumMod val="50000"/>
+                  </a:schemeClr>
+                </a:solidFill>
+              </a:rPr>
               <a:t> du projet avec </a:t>
             </a:r>
             <a:r>
-              <a:rPr lang="fr-FR" dirty="0" err="1" smtClean="0"/>
+              <a:rPr lang="fr-FR" sz="2100" dirty="0" err="1" smtClean="0">
+                <a:solidFill>
+                  <a:schemeClr val="bg2">
+                    <a:lumMod val="50000"/>
+                  </a:schemeClr>
+                </a:solidFill>
+              </a:rPr>
               <a:t>GitHub</a:t>
             </a:r>
             <a:r>
-              <a:rPr lang="fr-FR" dirty="0" smtClean="0"/>
+              <a:rPr lang="fr-FR" sz="2100" dirty="0" smtClean="0">
+                <a:solidFill>
+                  <a:schemeClr val="bg2">
+                    <a:lumMod val="50000"/>
+                  </a:schemeClr>
+                </a:solidFill>
+              </a:rPr>
               <a:t>.</a:t>
             </a:r>
             <a:br>
-              <a:rPr lang="fr-FR" dirty="0" smtClean="0"/>
+              <a:rPr lang="fr-FR" sz="2100" dirty="0" smtClean="0">
+                <a:solidFill>
+                  <a:schemeClr val="bg2">
+                    <a:lumMod val="50000"/>
+                  </a:schemeClr>
+                </a:solidFill>
+              </a:rPr>
             </a:br>
             <a:r>
-              <a:rPr lang="fr-FR" dirty="0" smtClean="0"/>
-              <a:t>• Présentation de </a:t>
-            </a:r>
-            <a:r>
-              <a:rPr lang="fr-FR" dirty="0"/>
-              <a:t>l'architecture </a:t>
-            </a:r>
-            <a:r>
-              <a:rPr lang="fr-FR" dirty="0" smtClean="0"/>
-              <a:t>technique.</a:t>
+              <a:rPr lang="fr-FR" sz="2100" dirty="0" smtClean="0">
+                <a:solidFill>
+                  <a:schemeClr val="bg2">
+                    <a:lumMod val="50000"/>
+                  </a:schemeClr>
+                </a:solidFill>
+              </a:rPr>
+              <a:t>• </a:t>
+            </a:r>
+            <a:r>
+              <a:rPr lang="fr-FR" sz="2100" dirty="0" smtClean="0">
+                <a:solidFill>
+                  <a:schemeClr val="bg2">
+                    <a:lumMod val="50000"/>
+                  </a:schemeClr>
+                </a:solidFill>
+              </a:rPr>
+              <a:t>Architecture technique MVC.</a:t>
+            </a:r>
+            <a:r>
+              <a:rPr lang="fr-FR" sz="2100" dirty="0" smtClean="0">
+                <a:solidFill>
+                  <a:schemeClr val="bg2">
+                    <a:lumMod val="50000"/>
+                  </a:schemeClr>
+                </a:solidFill>
+              </a:rPr>
+              <a:t/>
             </a:r>
             <a:br>
-              <a:rPr lang="fr-FR" dirty="0" smtClean="0"/>
+              <a:rPr lang="fr-FR" sz="2100" dirty="0" smtClean="0">
+                <a:solidFill>
+                  <a:schemeClr val="bg2">
+                    <a:lumMod val="50000"/>
+                  </a:schemeClr>
+                </a:solidFill>
+              </a:rPr>
             </a:br>
             <a:r>
-              <a:rPr lang="fr-FR" dirty="0" smtClean="0"/>
+              <a:rPr lang="fr-FR" sz="2100" dirty="0" smtClean="0">
+                <a:solidFill>
+                  <a:schemeClr val="bg2">
+                    <a:lumMod val="50000"/>
+                  </a:schemeClr>
+                </a:solidFill>
+              </a:rPr>
               <a:t>• Librairies intégrés ( Composer et </a:t>
             </a:r>
             <a:r>
-              <a:rPr lang="fr-FR" dirty="0" err="1" smtClean="0"/>
+              <a:rPr lang="fr-FR" sz="2100" dirty="0" err="1" smtClean="0">
+                <a:solidFill>
+                  <a:schemeClr val="bg2">
+                    <a:lumMod val="50000"/>
+                  </a:schemeClr>
+                </a:solidFill>
+              </a:rPr>
               <a:t>Twig</a:t>
             </a:r>
             <a:r>
-              <a:rPr lang="fr-FR" dirty="0" smtClean="0"/>
+              <a:rPr lang="fr-FR" sz="2100" dirty="0" smtClean="0">
+                <a:solidFill>
+                  <a:schemeClr val="bg2">
+                    <a:lumMod val="50000"/>
+                  </a:schemeClr>
+                </a:solidFill>
+              </a:rPr>
               <a:t> )</a:t>
             </a:r>
             <a:br>
-              <a:rPr lang="fr-FR" dirty="0" smtClean="0"/>
+              <a:rPr lang="fr-FR" sz="2100" dirty="0" smtClean="0">
+                <a:solidFill>
+                  <a:schemeClr val="bg2">
+                    <a:lumMod val="50000"/>
+                  </a:schemeClr>
+                </a:solidFill>
+              </a:rPr>
             </a:br>
             <a:r>
-              <a:rPr lang="fr-FR" dirty="0" smtClean="0"/>
+              <a:rPr lang="fr-FR" sz="2100" dirty="0" smtClean="0">
+                <a:solidFill>
+                  <a:schemeClr val="bg2">
+                    <a:lumMod val="50000"/>
+                  </a:schemeClr>
+                </a:solidFill>
+              </a:rPr>
               <a:t>• Présentation pull </a:t>
             </a:r>
             <a:r>
-              <a:rPr lang="fr-FR" dirty="0" err="1" smtClean="0"/>
+              <a:rPr lang="fr-FR" sz="2100" dirty="0" err="1" smtClean="0">
+                <a:solidFill>
+                  <a:schemeClr val="bg2">
+                    <a:lumMod val="50000"/>
+                  </a:schemeClr>
+                </a:solidFill>
+              </a:rPr>
               <a:t>request</a:t>
             </a:r>
             <a:r>
-              <a:rPr lang="fr-FR" dirty="0" smtClean="0"/>
+              <a:rPr lang="fr-FR" sz="2100" dirty="0" smtClean="0">
+                <a:solidFill>
+                  <a:schemeClr val="bg2">
+                    <a:lumMod val="50000"/>
+                  </a:schemeClr>
+                </a:solidFill>
+              </a:rPr>
               <a:t>.</a:t>
             </a:r>
             <a:br>
-              <a:rPr lang="fr-FR" dirty="0" smtClean="0"/>
+              <a:rPr lang="fr-FR" sz="2100" dirty="0" smtClean="0">
+                <a:solidFill>
+                  <a:schemeClr val="bg2">
+                    <a:lumMod val="50000"/>
+                  </a:schemeClr>
+                </a:solidFill>
+              </a:rPr>
             </a:br>
             <a:r>
-              <a:rPr lang="fr-FR" dirty="0" smtClean="0"/>
+              <a:rPr lang="fr-FR" sz="2100" dirty="0" smtClean="0">
+                <a:solidFill>
+                  <a:schemeClr val="bg2">
+                    <a:lumMod val="50000"/>
+                  </a:schemeClr>
+                </a:solidFill>
+              </a:rPr>
               <a:t>• présentation d’une </a:t>
             </a:r>
             <a:r>
-              <a:rPr lang="fr-FR" dirty="0"/>
+              <a:rPr lang="fr-FR" sz="2100" dirty="0">
+                <a:solidFill>
+                  <a:schemeClr val="bg2">
+                    <a:lumMod val="50000"/>
+                  </a:schemeClr>
+                </a:solidFill>
+              </a:rPr>
               <a:t>analyse </a:t>
             </a:r>
             <a:r>
-              <a:rPr lang="fr-FR" dirty="0" err="1" smtClean="0"/>
+              <a:rPr lang="fr-FR" sz="2100" dirty="0" err="1" smtClean="0">
+                <a:solidFill>
+                  <a:schemeClr val="bg2">
+                    <a:lumMod val="50000"/>
+                  </a:schemeClr>
+                </a:solidFill>
+              </a:rPr>
               <a:t>Codacy</a:t>
             </a:r>
             <a:r>
-              <a:rPr lang="fr-FR" dirty="0" smtClean="0"/>
+              <a:rPr lang="fr-FR" sz="2100" dirty="0" smtClean="0">
+                <a:solidFill>
+                  <a:schemeClr val="bg2">
+                    <a:lumMod val="50000"/>
+                  </a:schemeClr>
+                </a:solidFill>
+              </a:rPr>
               <a:t> et </a:t>
             </a:r>
             <a:r>
-              <a:rPr lang="fr-FR" dirty="0"/>
+              <a:rPr lang="fr-FR" sz="2100" dirty="0">
+                <a:solidFill>
+                  <a:schemeClr val="bg2">
+                    <a:lumMod val="50000"/>
+                  </a:schemeClr>
+                </a:solidFill>
+              </a:rPr>
               <a:t>les correctifs apportés </a:t>
             </a:r>
             <a:r>
-              <a:rPr lang="fr-FR" dirty="0" smtClean="0"/>
+              <a:rPr lang="fr-FR" sz="2100" dirty="0" smtClean="0">
+                <a:solidFill>
+                  <a:schemeClr val="bg2">
+                    <a:lumMod val="50000"/>
+                  </a:schemeClr>
+                </a:solidFill>
+              </a:rPr>
               <a:t>;</a:t>
             </a:r>
             <a:br>
-              <a:rPr lang="fr-FR" dirty="0" smtClean="0"/>
+              <a:rPr lang="fr-FR" sz="2100" dirty="0" smtClean="0">
+                <a:solidFill>
+                  <a:schemeClr val="bg2">
+                    <a:lumMod val="50000"/>
+                  </a:schemeClr>
+                </a:solidFill>
+              </a:rPr>
             </a:br>
             <a:r>
-              <a:rPr lang="fr-FR" dirty="0" smtClean="0"/>
+              <a:rPr lang="fr-FR" sz="2100" dirty="0" smtClean="0">
+                <a:solidFill>
+                  <a:schemeClr val="bg2">
+                    <a:lumMod val="50000"/>
+                  </a:schemeClr>
+                </a:solidFill>
+              </a:rPr>
               <a:t>• </a:t>
             </a:r>
             <a:r>
-              <a:rPr lang="fr-FR" dirty="0"/>
+              <a:rPr lang="fr-FR" sz="2100" dirty="0">
+                <a:solidFill>
+                  <a:schemeClr val="bg2">
+                    <a:lumMod val="50000"/>
+                  </a:schemeClr>
+                </a:solidFill>
+              </a:rPr>
               <a:t>comment vous avez procédé pour garantir la mise en place des bonnes pratiques en vigueur</a:t>
             </a:r>
             <a:r>
-              <a:rPr lang="fr-FR" dirty="0" smtClean="0"/>
+              <a:rPr lang="fr-FR" sz="2100" dirty="0" smtClean="0">
+                <a:solidFill>
+                  <a:schemeClr val="bg2">
+                    <a:lumMod val="50000"/>
+                  </a:schemeClr>
+                </a:solidFill>
+              </a:rPr>
               <a:t>.</a:t>
             </a:r>
-            <a:endParaRPr lang="fr-FR" dirty="0"/>
+            <a:endParaRPr lang="fr-FR" sz="2100" dirty="0">
+              <a:solidFill>
+                <a:schemeClr val="bg2">
+                  <a:lumMod val="50000"/>
+                </a:schemeClr>
+              </a:solidFill>
+            </a:endParaRPr>
           </a:p>
         </p:txBody>
       </p:sp>
@@ -7157,10 +7716,57 @@
           <a:lstStyle/>
           <a:p>
             <a:r>
-              <a:rPr lang="fr-FR" dirty="0" smtClean="0"/>
-              <a:t>1. Présentation du projet</a:t>
-            </a:r>
-            <a:endParaRPr lang="fr-FR" dirty="0"/>
+              <a:rPr lang="fr-FR" b="1" dirty="0" smtClean="0"/>
+              <a:t>1. </a:t>
+            </a:r>
+            <a:r>
+              <a:rPr lang="fr-FR" b="1" dirty="0" smtClean="0">
+                <a:solidFill>
+                  <a:schemeClr val="accent1"/>
+                </a:solidFill>
+                <a:effectLst>
+                  <a:outerShdw blurRad="38100" dist="38100" dir="2700000" algn="tl">
+                    <a:srgbClr val="000000">
+                      <a:alpha val="43137"/>
+                    </a:srgbClr>
+                  </a:outerShdw>
+                </a:effectLst>
+              </a:rPr>
+              <a:t>P</a:t>
+            </a:r>
+            <a:r>
+              <a:rPr lang="fr-FR" b="1" dirty="0" smtClean="0">
+                <a:solidFill>
+                  <a:schemeClr val="tx1">
+                    <a:lumMod val="65000"/>
+                    <a:lumOff val="35000"/>
+                  </a:schemeClr>
+                </a:solidFill>
+                <a:effectLst>
+                  <a:outerShdw blurRad="38100" dist="38100" dir="2700000" algn="tl">
+                    <a:srgbClr val="000000">
+                      <a:alpha val="43137"/>
+                    </a:srgbClr>
+                  </a:outerShdw>
+                </a:effectLst>
+              </a:rPr>
+              <a:t>résentation du projet</a:t>
+            </a:r>
+            <a:endParaRPr lang="fr-FR" b="1" dirty="0">
+              <a:solidFill>
+                <a:schemeClr val="tx1">
+                  <a:lumMod val="65000"/>
+                  <a:lumOff val="35000"/>
+                </a:schemeClr>
+              </a:solidFill>
+              <a:effectLst>
+                <a:outerShdw blurRad="38100" dist="38100" dir="2700000" algn="tl">
+                  <a:srgbClr val="000000">
+                    <a:alpha val="43137"/>
+                  </a:srgbClr>
+                </a:outerShdw>
+              </a:effectLst>
+            </a:endParaRPr>
           </a:p>
         </p:txBody>
       </p:sp>
@@ -7176,13 +7782,13 @@
         </p:nvSpPr>
         <p:spPr>
           <a:xfrm>
-            <a:off x="1492937" y="1475119"/>
-            <a:ext cx="10018713" cy="4635259"/>
+            <a:off x="1561948" y="1475119"/>
+            <a:ext cx="10018713" cy="5011945"/>
           </a:xfrm>
         </p:spPr>
         <p:txBody>
           <a:bodyPr>
-            <a:normAutofit fontScale="70000" lnSpcReduction="20000"/>
+            <a:normAutofit fontScale="55000" lnSpcReduction="20000"/>
           </a:bodyPr>
           <a:lstStyle/>
           <a:p>
@@ -7190,68 +7796,177 @@
               <a:buNone/>
             </a:pPr>
             <a:r>
-              <a:rPr lang="fr-FR" dirty="0" smtClean="0"/>
+              <a:rPr lang="fr-FR" sz="2900" dirty="0" smtClean="0">
+                <a:solidFill>
+                  <a:schemeClr val="bg2">
+                    <a:lumMod val="50000"/>
+                  </a:schemeClr>
+                </a:solidFill>
+              </a:rPr>
               <a:t>•</a:t>
             </a:r>
             <a:r>
-              <a:rPr lang="fr-FR" dirty="0"/>
+              <a:rPr lang="fr-FR" sz="2900" dirty="0">
+                <a:solidFill>
+                  <a:schemeClr val="bg2">
+                    <a:lumMod val="50000"/>
+                  </a:schemeClr>
+                </a:solidFill>
+              </a:rPr>
               <a:t> </a:t>
             </a:r>
             <a:r>
-              <a:rPr lang="fr-FR" dirty="0" smtClean="0"/>
-              <a:t>CONTEXT :</a:t>
-            </a:r>
-            <a:br>
-              <a:rPr lang="fr-FR" dirty="0" smtClean="0"/>
-            </a:br>
-            <a:r>
-              <a:rPr lang="fr-FR" dirty="0" smtClean="0"/>
+              <a:rPr lang="fr-FR" sz="2700" b="1" u="sng" dirty="0" smtClean="0">
+                <a:solidFill>
+                  <a:schemeClr val="tx2">
+                    <a:lumMod val="50000"/>
+                    <a:lumOff val="50000"/>
+                  </a:schemeClr>
+                </a:solidFill>
+              </a:rPr>
+              <a:t>C</a:t>
+            </a:r>
+            <a:r>
+              <a:rPr lang="fr-FR" sz="2700" b="1" u="sng" dirty="0" smtClean="0">
+                <a:solidFill>
+                  <a:schemeClr val="accent1"/>
+                </a:solidFill>
+              </a:rPr>
+              <a:t>ONTEXT</a:t>
+            </a:r>
+          </a:p>
+          <a:p>
+            <a:pPr marL="0" indent="0">
+              <a:buNone/>
+            </a:pPr>
+            <a:r>
+              <a:rPr lang="fr-FR" dirty="0" smtClean="0">
+                <a:solidFill>
+                  <a:schemeClr val="bg2">
+                    <a:lumMod val="50000"/>
+                  </a:schemeClr>
+                </a:solidFill>
+              </a:rPr>
               <a:t>Création d’un blog professionnel en tant que développeur web </a:t>
             </a:r>
             <a:r>
-              <a:rPr lang="fr-FR" dirty="0" err="1" smtClean="0"/>
+              <a:rPr lang="fr-FR" dirty="0" err="1" smtClean="0">
+                <a:solidFill>
+                  <a:schemeClr val="bg2">
+                    <a:lumMod val="50000"/>
+                  </a:schemeClr>
+                </a:solidFill>
+              </a:rPr>
               <a:t>php</a:t>
             </a:r>
-            <a:endParaRPr lang="fr-FR" dirty="0" smtClean="0"/>
+            <a:r>
+              <a:rPr lang="fr-FR" dirty="0" smtClean="0">
+                <a:solidFill>
+                  <a:schemeClr val="bg2">
+                    <a:lumMod val="50000"/>
+                  </a:schemeClr>
+                </a:solidFill>
+              </a:rPr>
+              <a:t>.</a:t>
+            </a:r>
           </a:p>
           <a:p>
             <a:pPr marL="0" indent="0">
               <a:buNone/>
             </a:pPr>
-            <a:endParaRPr lang="fr-FR" dirty="0"/>
+            <a:endParaRPr lang="fr-FR" dirty="0">
+              <a:solidFill>
+                <a:schemeClr val="bg2">
+                  <a:lumMod val="50000"/>
+                </a:schemeClr>
+              </a:solidFill>
+            </a:endParaRPr>
           </a:p>
           <a:p>
             <a:pPr marL="0" indent="0">
               <a:buNone/>
             </a:pPr>
             <a:r>
-              <a:rPr lang="fr-FR" dirty="0" smtClean="0"/>
-              <a:t>• ANALYSE DU BESOIN :</a:t>
-            </a:r>
-          </a:p>
-          <a:p>
-            <a:pPr marL="0" indent="0">
-              <a:buNone/>
-            </a:pPr>
-            <a:r>
-              <a:rPr lang="fr-FR" dirty="0" smtClean="0"/>
-              <a:t>Mettre un commentaire à un post du blog spécifique.</a:t>
-            </a:r>
-          </a:p>
-          <a:p>
-            <a:pPr marL="0" indent="0">
-              <a:buNone/>
-            </a:pPr>
-            <a:endParaRPr lang="fr-FR" dirty="0" smtClean="0"/>
-          </a:p>
-          <a:p>
-            <a:pPr marL="0" indent="0">
-              <a:buNone/>
-            </a:pPr>
-            <a:r>
-              <a:rPr lang="fr-FR" dirty="0" smtClean="0"/>
-              <a:t>• ORGANISATION DU PROJET :</a:t>
-            </a:r>
+              <a:rPr lang="fr-FR" sz="2700" b="1" dirty="0">
+                <a:solidFill>
+                  <a:schemeClr val="accent1"/>
+                </a:solidFill>
+              </a:rPr>
+              <a:t>• </a:t>
+            </a:r>
+            <a:r>
+              <a:rPr lang="fr-FR" sz="2700" b="1" u="sng" dirty="0">
+                <a:solidFill>
+                  <a:schemeClr val="tx2">
+                    <a:lumMod val="50000"/>
+                    <a:lumOff val="50000"/>
+                  </a:schemeClr>
+                </a:solidFill>
+              </a:rPr>
+              <a:t>A</a:t>
+            </a:r>
+            <a:r>
+              <a:rPr lang="fr-FR" sz="2700" b="1" u="sng" dirty="0">
+                <a:solidFill>
+                  <a:schemeClr val="accent1"/>
+                </a:solidFill>
+              </a:rPr>
+              <a:t>NALYSE DU </a:t>
+            </a:r>
+            <a:r>
+              <a:rPr lang="fr-FR" sz="2700" b="1" u="sng" dirty="0" smtClean="0">
+                <a:solidFill>
+                  <a:schemeClr val="accent1"/>
+                </a:solidFill>
+              </a:rPr>
+              <a:t>BESOIN D ’UNE FONCTIONNALITÉ</a:t>
+            </a:r>
+            <a:r>
+              <a:rPr lang="fr-FR" sz="2700" b="1" dirty="0" smtClean="0">
+                <a:solidFill>
+                  <a:schemeClr val="accent1"/>
+                </a:solidFill>
+              </a:rPr>
+              <a:t> </a:t>
+            </a:r>
+            <a:r>
+              <a:rPr lang="fr-FR" b="1" dirty="0" smtClean="0">
+                <a:solidFill>
+                  <a:schemeClr val="tx2">
+                    <a:lumMod val="50000"/>
+                    <a:lumOff val="50000"/>
+                  </a:schemeClr>
+                </a:solidFill>
+              </a:rPr>
+              <a:t>--&gt;</a:t>
+            </a:r>
+            <a:r>
+              <a:rPr lang="fr-FR" b="1" dirty="0" smtClean="0">
+                <a:solidFill>
+                  <a:schemeClr val="accent1"/>
+                </a:solidFill>
+              </a:rPr>
+              <a:t> </a:t>
+            </a:r>
+            <a:r>
+              <a:rPr lang="fr-FR" b="1" dirty="0" smtClean="0">
+                <a:solidFill>
+                  <a:schemeClr val="tx2">
+                    <a:lumMod val="50000"/>
+                    <a:lumOff val="50000"/>
+                  </a:schemeClr>
+                </a:solidFill>
+              </a:rPr>
+              <a:t>Commenter un post</a:t>
+            </a:r>
+            <a:endParaRPr lang="fr-FR" b="1" dirty="0">
+              <a:solidFill>
+                <a:schemeClr val="tx2">
+                  <a:lumMod val="50000"/>
+                  <a:lumOff val="50000"/>
+                </a:schemeClr>
+              </a:solidFill>
+            </a:endParaRPr>
           </a:p>
           <a:p>
             <a:pPr>
@@ -7259,9 +7974,120 @@
               <a:buChar char="-"/>
             </a:pPr>
             <a:r>
-              <a:rPr lang="fr-FR" dirty="0" smtClean="0"/>
-              <a:t>Analyse tous les besoins du projets + diagrammes UML.</a:t>
-            </a:r>
+              <a:rPr lang="fr-FR" dirty="0" smtClean="0">
+                <a:solidFill>
+                  <a:schemeClr val="bg2">
+                    <a:lumMod val="50000"/>
+                  </a:schemeClr>
+                </a:solidFill>
+              </a:rPr>
+              <a:t>Analyse du besoin avec une présentation des différents schémas UML</a:t>
+            </a:r>
+          </a:p>
+          <a:p>
+            <a:pPr lvl="1">
+              <a:buFontTx/>
+              <a:buChar char="-"/>
+            </a:pPr>
+            <a:r>
+              <a:rPr lang="fr-FR" dirty="0" smtClean="0">
+                <a:solidFill>
+                  <a:schemeClr val="bg2">
+                    <a:lumMod val="50000"/>
+                  </a:schemeClr>
+                </a:solidFill>
+              </a:rPr>
+              <a:t>Diagramme de cas d’utilisation</a:t>
+            </a:r>
+          </a:p>
+          <a:p>
+            <a:pPr lvl="1">
+              <a:buFontTx/>
+              <a:buChar char="-"/>
+            </a:pPr>
+            <a:r>
+              <a:rPr lang="fr-FR" dirty="0" smtClean="0">
+                <a:solidFill>
+                  <a:schemeClr val="bg2">
+                    <a:lumMod val="50000"/>
+                  </a:schemeClr>
+                </a:solidFill>
+              </a:rPr>
+              <a:t>Diagramme de séquence</a:t>
+            </a:r>
+          </a:p>
+          <a:p>
+            <a:pPr lvl="1">
+              <a:buFontTx/>
+              <a:buChar char="-"/>
+            </a:pPr>
+            <a:r>
+              <a:rPr lang="fr-FR" dirty="0" smtClean="0">
+                <a:solidFill>
+                  <a:schemeClr val="bg2">
+                    <a:lumMod val="50000"/>
+                  </a:schemeClr>
+                </a:solidFill>
+              </a:rPr>
+              <a:t>Diagramme de classe</a:t>
+            </a:r>
+          </a:p>
+          <a:p>
+            <a:pPr marL="0" indent="0">
+              <a:buNone/>
+            </a:pPr>
+            <a:endParaRPr lang="fr-FR" dirty="0" smtClean="0">
+              <a:solidFill>
+                <a:schemeClr val="bg2">
+                  <a:lumMod val="50000"/>
+                </a:schemeClr>
+              </a:solidFill>
+            </a:endParaRPr>
+          </a:p>
+          <a:p>
+            <a:pPr marL="0" indent="0">
+              <a:buNone/>
+            </a:pPr>
+            <a:r>
+              <a:rPr lang="fr-FR" sz="2700" b="1" dirty="0">
+                <a:solidFill>
+                  <a:schemeClr val="accent1"/>
+                </a:solidFill>
+              </a:rPr>
+              <a:t>• </a:t>
+            </a:r>
+            <a:r>
+              <a:rPr lang="fr-FR" sz="2700" b="1" u="sng" dirty="0">
+                <a:solidFill>
+                  <a:schemeClr val="tx2">
+                    <a:lumMod val="50000"/>
+                    <a:lumOff val="50000"/>
+                  </a:schemeClr>
+                </a:solidFill>
+              </a:rPr>
+              <a:t>O</a:t>
+            </a:r>
+            <a:r>
+              <a:rPr lang="fr-FR" sz="2700" b="1" u="sng" dirty="0">
+                <a:solidFill>
+                  <a:schemeClr val="accent1"/>
+                </a:solidFill>
+              </a:rPr>
+              <a:t>RGANISATION DU </a:t>
+            </a:r>
+            <a:r>
+              <a:rPr lang="fr-FR" sz="2700" b="1" u="sng" dirty="0" smtClean="0">
+                <a:solidFill>
+                  <a:schemeClr val="accent1"/>
+                </a:solidFill>
+              </a:rPr>
+              <a:t>PROJET</a:t>
+            </a:r>
+            <a:endParaRPr lang="fr-FR" sz="2700" b="1" u="sng" dirty="0">
+              <a:solidFill>
+                <a:schemeClr val="accent1"/>
+              </a:solidFill>
+            </a:endParaRPr>
           </a:p>
           <a:p>
             <a:pPr>
@@ -7269,8 +8095,54 @@
               <a:buChar char="-"/>
             </a:pPr>
             <a:r>
-              <a:rPr lang="fr-FR" dirty="0" smtClean="0"/>
-              <a:t>Création des textes et contenues du site.</a:t>
+              <a:rPr lang="fr-FR" dirty="0" smtClean="0">
+                <a:solidFill>
+                  <a:schemeClr val="bg2">
+                    <a:lumMod val="50000"/>
+                  </a:schemeClr>
+                </a:solidFill>
+              </a:rPr>
+              <a:t>Définitions </a:t>
+            </a:r>
+            <a:r>
+              <a:rPr lang="fr-FR" dirty="0">
+                <a:solidFill>
+                  <a:schemeClr val="bg2">
+                    <a:lumMod val="50000"/>
+                  </a:schemeClr>
+                </a:solidFill>
+              </a:rPr>
+              <a:t>des différentes tâches à </a:t>
+            </a:r>
+            <a:r>
+              <a:rPr lang="fr-FR" dirty="0" smtClean="0">
+                <a:solidFill>
+                  <a:schemeClr val="bg2">
+                    <a:lumMod val="50000"/>
+                  </a:schemeClr>
+                </a:solidFill>
+              </a:rPr>
+              <a:t>réalisés (</a:t>
+            </a:r>
+            <a:r>
+              <a:rPr lang="fr-FR" dirty="0">
+                <a:solidFill>
+                  <a:schemeClr val="bg2">
+                    <a:lumMod val="50000"/>
+                  </a:schemeClr>
+                </a:solidFill>
+              </a:rPr>
+              <a:t> </a:t>
+            </a:r>
+            <a:r>
+              <a:rPr lang="fr-FR" dirty="0" smtClean="0">
+                <a:solidFill>
+                  <a:schemeClr val="bg2">
+                    <a:lumMod val="50000"/>
+                  </a:schemeClr>
+                </a:solidFill>
+              </a:rPr>
+              <a:t>Sauvegarde et suivis du projet, librairies, outils et réalisations ) </a:t>
             </a:r>
           </a:p>
           <a:p>
@@ -7279,9 +8151,32 @@
               <a:buChar char="-"/>
             </a:pPr>
             <a:r>
-              <a:rPr lang="fr-FR" dirty="0" smtClean="0"/>
-              <a:t>Remplir la base de donnée et jeux de fausse données.</a:t>
-            </a:r>
+              <a:rPr lang="fr-FR" dirty="0">
+                <a:solidFill>
+                  <a:schemeClr val="bg2">
+                    <a:lumMod val="50000"/>
+                  </a:schemeClr>
+                </a:solidFill>
+              </a:rPr>
+              <a:t>Initialisation du projet et sauvegarde de celui-ci avec </a:t>
+            </a:r>
+            <a:r>
+              <a:rPr lang="fr-FR" dirty="0" err="1" smtClean="0">
+                <a:solidFill>
+                  <a:schemeClr val="bg2">
+                    <a:lumMod val="50000"/>
+                  </a:schemeClr>
+                </a:solidFill>
+              </a:rPr>
+              <a:t>GitHub</a:t>
+            </a:r>
+            <a:endParaRPr lang="fr-FR" dirty="0" smtClean="0">
+              <a:solidFill>
+                <a:schemeClr val="bg2">
+                  <a:lumMod val="50000"/>
+                </a:schemeClr>
+              </a:solidFill>
+            </a:endParaRPr>
           </a:p>
           <a:p>
             <a:pPr>
@@ -7289,17 +8184,42 @@
               <a:buChar char="-"/>
             </a:pPr>
             <a:r>
-              <a:rPr lang="fr-FR" dirty="0" smtClean="0"/>
-              <a:t>Initialisation du projet avec </a:t>
-            </a:r>
-            <a:r>
-              <a:rPr lang="fr-FR" dirty="0" err="1" smtClean="0"/>
+              <a:rPr lang="fr-FR" dirty="0" smtClean="0">
+                <a:solidFill>
+                  <a:schemeClr val="bg2">
+                    <a:lumMod val="50000"/>
+                  </a:schemeClr>
+                </a:solidFill>
+              </a:rPr>
+              <a:t>Répartitions chronologies des tâches dans le temps avec </a:t>
+            </a:r>
+            <a:r>
+              <a:rPr lang="fr-FR" dirty="0" err="1" smtClean="0">
+                <a:solidFill>
+                  <a:schemeClr val="bg2">
+                    <a:lumMod val="50000"/>
+                  </a:schemeClr>
+                </a:solidFill>
+              </a:rPr>
               <a:t>GitHub</a:t>
             </a:r>
             <a:r>
-              <a:rPr lang="fr-FR" dirty="0" smtClean="0"/>
-              <a:t>.</a:t>
-            </a:r>
+              <a:rPr lang="fr-FR" dirty="0" smtClean="0">
+                <a:solidFill>
+                  <a:schemeClr val="bg2">
+                    <a:lumMod val="50000"/>
+                  </a:schemeClr>
+                </a:solidFill>
+              </a:rPr>
+              <a:t> ( Issues)</a:t>
+            </a:r>
+            <a:endParaRPr lang="fr-FR" dirty="0" smtClean="0">
+              <a:solidFill>
+                <a:schemeClr val="bg2">
+                  <a:lumMod val="50000"/>
+                </a:schemeClr>
+              </a:solidFill>
+            </a:endParaRPr>
           </a:p>
           <a:p>
             <a:pPr>
@@ -7307,9 +8227,32 @@
               <a:buChar char="-"/>
             </a:pPr>
             <a:r>
-              <a:rPr lang="fr-FR" dirty="0" smtClean="0"/>
-              <a:t>Création de la structure du site en MVC.</a:t>
-            </a:r>
+              <a:rPr lang="fr-FR" dirty="0" smtClean="0">
+                <a:solidFill>
+                  <a:schemeClr val="bg2">
+                    <a:lumMod val="50000"/>
+                  </a:schemeClr>
+                </a:solidFill>
+              </a:rPr>
+              <a:t>Remplir la base de donnée et jeux de fausse données</a:t>
+            </a:r>
+            <a:r>
+              <a:rPr lang="fr-FR" dirty="0" smtClean="0">
+                <a:solidFill>
+                  <a:schemeClr val="bg2">
+                    <a:lumMod val="50000"/>
+                  </a:schemeClr>
+                </a:solidFill>
+              </a:rPr>
+              <a:t>.</a:t>
+            </a:r>
+            <a:endParaRPr lang="fr-FR" dirty="0" smtClean="0">
+              <a:solidFill>
+                <a:schemeClr val="bg2">
+                  <a:lumMod val="50000"/>
+                </a:schemeClr>
+              </a:solidFill>
+            </a:endParaRPr>
           </a:p>
           <a:p>
             <a:pPr>
@@ -7317,15 +8260,74 @@
               <a:buChar char="-"/>
             </a:pPr>
             <a:r>
-              <a:rPr lang="fr-FR" dirty="0" smtClean="0"/>
-              <a:t>Intégration de TWIG et création du projet.</a:t>
-            </a:r>
+              <a:rPr lang="fr-FR" dirty="0" smtClean="0">
+                <a:solidFill>
+                  <a:schemeClr val="bg2">
+                    <a:lumMod val="50000"/>
+                  </a:schemeClr>
+                </a:solidFill>
+              </a:rPr>
+              <a:t>Création de la structure </a:t>
+            </a:r>
+            <a:r>
+              <a:rPr lang="fr-FR" dirty="0" smtClean="0">
+                <a:solidFill>
+                  <a:schemeClr val="bg2">
+                    <a:lumMod val="50000"/>
+                  </a:schemeClr>
+                </a:solidFill>
+              </a:rPr>
+              <a:t>du site.</a:t>
+            </a:r>
+            <a:endParaRPr lang="fr-FR" dirty="0" smtClean="0">
+              <a:solidFill>
+                <a:schemeClr val="bg2">
+                  <a:lumMod val="50000"/>
+                </a:schemeClr>
+              </a:solidFill>
+            </a:endParaRPr>
           </a:p>
           <a:p>
             <a:pPr>
               <a:buFontTx/>
               <a:buChar char="-"/>
             </a:pPr>
+            <a:r>
+              <a:rPr lang="fr-FR" dirty="0" smtClean="0">
+                <a:solidFill>
+                  <a:schemeClr val="bg2">
+                    <a:lumMod val="50000"/>
+                  </a:schemeClr>
+                </a:solidFill>
+              </a:rPr>
+              <a:t>Intégration </a:t>
+            </a:r>
+            <a:r>
+              <a:rPr lang="fr-FR" dirty="0" smtClean="0">
+                <a:solidFill>
+                  <a:schemeClr val="bg2">
+                    <a:lumMod val="50000"/>
+                  </a:schemeClr>
+                </a:solidFill>
+              </a:rPr>
+              <a:t>de la librairies TWIG avec composer</a:t>
+            </a:r>
+          </a:p>
+          <a:p>
+            <a:pPr>
+              <a:buFontTx/>
+              <a:buChar char="-"/>
+            </a:pPr>
+            <a:r>
+              <a:rPr lang="fr-FR" dirty="0" smtClean="0">
+                <a:solidFill>
+                  <a:schemeClr val="bg2">
+                    <a:lumMod val="50000"/>
+                  </a:schemeClr>
+                </a:solidFill>
+              </a:rPr>
+              <a:t>Réalisations du projet</a:t>
+            </a:r>
             <a:endParaRPr lang="fr-FR" dirty="0" smtClean="0"/>
           </a:p>
           <a:p>
@@ -7376,104 +8378,567 @@
             <p:ph type="title"/>
           </p:nvPr>
         </p:nvSpPr>
-        <p:spPr/>
-        <p:txBody>
-          <a:bodyPr/>
+        <p:spPr>
+          <a:xfrm>
+            <a:off x="1484310" y="202722"/>
+            <a:ext cx="10018713" cy="892833"/>
+          </a:xfrm>
+        </p:spPr>
+        <p:txBody>
+          <a:bodyPr>
+            <a:normAutofit/>
+          </a:bodyPr>
           <a:lstStyle/>
           <a:p>
             <a:r>
-              <a:rPr lang="fr-FR" dirty="0" smtClean="0"/>
-              <a:t>3. Point de vue technique du projet </a:t>
-            </a:r>
+              <a:rPr lang="fr-FR" b="1" dirty="0">
+                <a:solidFill>
+                  <a:schemeClr val="tx1">
+                    <a:lumMod val="65000"/>
+                    <a:lumOff val="35000"/>
+                  </a:schemeClr>
+                </a:solidFill>
+                <a:effectLst>
+                  <a:outerShdw blurRad="38100" dist="38100" dir="2700000" algn="tl">
+                    <a:srgbClr val="000000">
+                      <a:alpha val="43137"/>
+                    </a:srgbClr>
+                  </a:outerShdw>
+                </a:effectLst>
+              </a:rPr>
+              <a:t>3. </a:t>
+            </a:r>
+            <a:r>
+              <a:rPr lang="fr-FR" b="1" dirty="0">
+                <a:solidFill>
+                  <a:schemeClr val="accent1"/>
+                </a:solidFill>
+                <a:effectLst>
+                  <a:outerShdw blurRad="38100" dist="38100" dir="2700000" algn="tl">
+                    <a:srgbClr val="000000">
+                      <a:alpha val="43137"/>
+                    </a:srgbClr>
+                  </a:outerShdw>
+                </a:effectLst>
+              </a:rPr>
+              <a:t>P</a:t>
+            </a:r>
+            <a:r>
+              <a:rPr lang="fr-FR" b="1" dirty="0">
+                <a:solidFill>
+                  <a:schemeClr val="tx1">
+                    <a:lumMod val="65000"/>
+                    <a:lumOff val="35000"/>
+                  </a:schemeClr>
+                </a:solidFill>
+                <a:effectLst>
+                  <a:outerShdw blurRad="38100" dist="38100" dir="2700000" algn="tl">
+                    <a:srgbClr val="000000">
+                      <a:alpha val="43137"/>
+                    </a:srgbClr>
+                  </a:outerShdw>
+                </a:effectLst>
+              </a:rPr>
+              <a:t>oint de vue technique du projet </a:t>
+            </a:r>
+            <a:endParaRPr lang="fr-FR" b="1" dirty="0">
+              <a:solidFill>
+                <a:schemeClr val="tx1">
+                  <a:lumMod val="65000"/>
+                  <a:lumOff val="35000"/>
+                </a:schemeClr>
+              </a:solidFill>
+              <a:effectLst>
+                <a:outerShdw blurRad="38100" dist="38100" dir="2700000" algn="tl">
+                  <a:srgbClr val="000000">
+                    <a:alpha val="43137"/>
+                  </a:srgbClr>
+                </a:outerShdw>
+              </a:effectLst>
+            </a:endParaRPr>
+          </a:p>
+        </p:txBody>
+      </p:sp>
+      <p:sp>
+        <p:nvSpPr>
+          <p:cNvPr id="3" name="Espace réservé du contenu 2"/>
+          <p:cNvSpPr>
+            <a:spLocks noGrp="1"/>
+          </p:cNvSpPr>
+          <p:nvPr>
+            <p:ph idx="1"/>
+          </p:nvPr>
+        </p:nvSpPr>
+        <p:spPr>
+          <a:xfrm>
+            <a:off x="1484310" y="1604513"/>
+            <a:ext cx="10018713" cy="4572000"/>
+          </a:xfrm>
+        </p:spPr>
+        <p:txBody>
+          <a:bodyPr>
+            <a:normAutofit/>
+          </a:bodyPr>
+          <a:lstStyle/>
+          <a:p>
+            <a:pPr marL="0" indent="0">
+              <a:buNone/>
+            </a:pPr>
+            <a:r>
+              <a:rPr lang="fr-FR" sz="1900" b="1" dirty="0">
+                <a:solidFill>
+                  <a:schemeClr val="bg2">
+                    <a:lumMod val="50000"/>
+                  </a:schemeClr>
+                </a:solidFill>
+                <a:effectLst>
+                  <a:outerShdw blurRad="38100" dist="38100" dir="2700000" algn="tl">
+                    <a:srgbClr val="000000">
+                      <a:alpha val="43137"/>
+                    </a:srgbClr>
+                  </a:outerShdw>
+                </a:effectLst>
+              </a:rPr>
+              <a:t>G</a:t>
+            </a:r>
+            <a:r>
+              <a:rPr lang="fr-FR" sz="1900" b="1" dirty="0" smtClean="0">
+                <a:solidFill>
+                  <a:schemeClr val="accent1"/>
+                </a:solidFill>
+              </a:rPr>
+              <a:t>estion </a:t>
+            </a:r>
+            <a:r>
+              <a:rPr lang="fr-FR" sz="1900" b="1" dirty="0">
+                <a:solidFill>
+                  <a:schemeClr val="accent1"/>
+                </a:solidFill>
+              </a:rPr>
+              <a:t>du </a:t>
+            </a:r>
+            <a:r>
+              <a:rPr lang="fr-FR" sz="1900" b="1" dirty="0" smtClean="0">
+                <a:solidFill>
+                  <a:schemeClr val="accent1"/>
+                </a:solidFill>
+              </a:rPr>
+              <a:t>projet :</a:t>
+            </a:r>
+            <a:endParaRPr lang="fr-FR" sz="1900" b="1" dirty="0">
+              <a:solidFill>
+                <a:schemeClr val="bg2">
+                  <a:lumMod val="50000"/>
+                </a:schemeClr>
+              </a:solidFill>
+            </a:endParaRPr>
+          </a:p>
+          <a:p>
+            <a:pPr lvl="1"/>
+            <a:r>
+              <a:rPr lang="fr-FR" sz="1700" dirty="0" err="1" smtClean="0">
+                <a:solidFill>
+                  <a:schemeClr val="bg2">
+                    <a:lumMod val="50000"/>
+                  </a:schemeClr>
+                </a:solidFill>
+              </a:rPr>
+              <a:t>Versionnage</a:t>
+            </a:r>
+            <a:r>
+              <a:rPr lang="fr-FR" sz="1700" dirty="0" smtClean="0">
+                <a:solidFill>
+                  <a:schemeClr val="bg2">
+                    <a:lumMod val="50000"/>
+                  </a:schemeClr>
+                </a:solidFill>
+              </a:rPr>
+              <a:t> </a:t>
+            </a:r>
+            <a:r>
+              <a:rPr lang="fr-FR" sz="1700" dirty="0">
+                <a:solidFill>
+                  <a:schemeClr val="bg2">
+                    <a:lumMod val="50000"/>
+                  </a:schemeClr>
+                </a:solidFill>
+              </a:rPr>
+              <a:t>du projet avec </a:t>
+            </a:r>
+            <a:r>
+              <a:rPr lang="fr-FR" sz="1700" dirty="0" err="1" smtClean="0">
+                <a:solidFill>
+                  <a:schemeClr val="bg2">
+                    <a:lumMod val="50000"/>
+                  </a:schemeClr>
+                </a:solidFill>
+              </a:rPr>
+              <a:t>GitHub</a:t>
+            </a:r>
+            <a:r>
+              <a:rPr lang="fr-FR" sz="1700" dirty="0" smtClean="0">
+                <a:solidFill>
+                  <a:schemeClr val="bg2">
+                    <a:lumMod val="50000"/>
+                  </a:schemeClr>
+                </a:solidFill>
+              </a:rPr>
+              <a:t>.</a:t>
+            </a:r>
+            <a:endParaRPr lang="fr-FR" sz="1700" dirty="0">
+              <a:solidFill>
+                <a:schemeClr val="bg2">
+                  <a:lumMod val="50000"/>
+                </a:schemeClr>
+              </a:solidFill>
+            </a:endParaRPr>
+          </a:p>
+          <a:p>
+            <a:pPr lvl="1"/>
+            <a:endParaRPr lang="fr-FR" dirty="0" smtClean="0"/>
+          </a:p>
+          <a:p>
+            <a:pPr marL="0" indent="0">
+              <a:buNone/>
+            </a:pPr>
+            <a:r>
+              <a:rPr lang="fr-FR" sz="1900" b="1" dirty="0">
+                <a:solidFill>
+                  <a:schemeClr val="bg2">
+                    <a:lumMod val="50000"/>
+                  </a:schemeClr>
+                </a:solidFill>
+                <a:effectLst>
+                  <a:outerShdw blurRad="38100" dist="38100" dir="2700000" algn="tl">
+                    <a:srgbClr val="000000">
+                      <a:alpha val="43137"/>
+                    </a:srgbClr>
+                  </a:outerShdw>
+                </a:effectLst>
+              </a:rPr>
+              <a:t>R</a:t>
+            </a:r>
+            <a:r>
+              <a:rPr lang="fr-FR" sz="1900" b="1" dirty="0">
+                <a:solidFill>
+                  <a:schemeClr val="accent1"/>
+                </a:solidFill>
+              </a:rPr>
+              <a:t>éalisation du projet :</a:t>
+            </a:r>
+          </a:p>
+          <a:p>
+            <a:pPr lvl="1"/>
+            <a:r>
+              <a:rPr lang="fr-FR" sz="1700" dirty="0" smtClean="0">
+                <a:solidFill>
+                  <a:schemeClr val="bg2">
+                    <a:lumMod val="50000"/>
+                  </a:schemeClr>
+                </a:solidFill>
+              </a:rPr>
+              <a:t>Structure </a:t>
+            </a:r>
+            <a:r>
+              <a:rPr lang="fr-FR" sz="1700" dirty="0" smtClean="0">
+                <a:solidFill>
+                  <a:schemeClr val="bg2">
+                    <a:lumMod val="50000"/>
+                  </a:schemeClr>
+                </a:solidFill>
+              </a:rPr>
+              <a:t>du site en </a:t>
+            </a:r>
+            <a:r>
+              <a:rPr lang="fr-FR" sz="1700" dirty="0" smtClean="0">
+                <a:solidFill>
+                  <a:schemeClr val="bg2">
+                    <a:lumMod val="50000"/>
+                  </a:schemeClr>
+                </a:solidFill>
+              </a:rPr>
+              <a:t>MVC  et Programmation objet</a:t>
+            </a:r>
+            <a:endParaRPr lang="fr-FR" sz="1700" dirty="0" smtClean="0">
+              <a:solidFill>
+                <a:schemeClr val="bg2">
+                  <a:lumMod val="50000"/>
+                </a:schemeClr>
+              </a:solidFill>
+            </a:endParaRPr>
+          </a:p>
+          <a:p>
+            <a:pPr lvl="1"/>
+            <a:r>
+              <a:rPr lang="fr-FR" sz="1700" dirty="0" smtClean="0">
+                <a:solidFill>
+                  <a:schemeClr val="bg2">
+                    <a:lumMod val="50000"/>
+                  </a:schemeClr>
+                </a:solidFill>
+              </a:rPr>
+              <a:t>Installation de la librairie</a:t>
+            </a:r>
+            <a:r>
+              <a:rPr lang="fr-FR" sz="1700" dirty="0" smtClean="0">
+                <a:solidFill>
+                  <a:schemeClr val="bg2">
+                    <a:lumMod val="50000"/>
+                  </a:schemeClr>
+                </a:solidFill>
+              </a:rPr>
+              <a:t> « </a:t>
+            </a:r>
+            <a:r>
+              <a:rPr lang="fr-FR" sz="1700" dirty="0" smtClean="0">
+                <a:solidFill>
+                  <a:schemeClr val="bg2">
+                    <a:lumMod val="50000"/>
+                  </a:schemeClr>
+                </a:solidFill>
+              </a:rPr>
+              <a:t>TWIG  »</a:t>
+            </a:r>
+            <a:endParaRPr lang="fr-FR" sz="1700" dirty="0" smtClean="0">
+              <a:solidFill>
+                <a:schemeClr val="bg2">
+                  <a:lumMod val="50000"/>
+                </a:schemeClr>
+              </a:solidFill>
+            </a:endParaRPr>
+          </a:p>
+          <a:p>
+            <a:pPr lvl="1"/>
+            <a:r>
+              <a:rPr lang="fr-FR" sz="1700" dirty="0" smtClean="0">
+                <a:solidFill>
+                  <a:schemeClr val="bg2">
+                    <a:lumMod val="50000"/>
+                  </a:schemeClr>
+                </a:solidFill>
+              </a:rPr>
+              <a:t>Pull </a:t>
+            </a:r>
+            <a:r>
+              <a:rPr lang="fr-FR" sz="1700" dirty="0" err="1" smtClean="0">
+                <a:solidFill>
+                  <a:schemeClr val="bg2">
+                    <a:lumMod val="50000"/>
+                  </a:schemeClr>
+                </a:solidFill>
+              </a:rPr>
+              <a:t>Request</a:t>
+            </a:r>
+            <a:r>
+              <a:rPr lang="fr-FR" sz="1700" dirty="0" smtClean="0">
+                <a:solidFill>
+                  <a:schemeClr val="bg2">
+                    <a:lumMod val="50000"/>
+                  </a:schemeClr>
+                </a:solidFill>
+              </a:rPr>
+              <a:t> </a:t>
+            </a:r>
+          </a:p>
+          <a:p>
+            <a:pPr marL="457200" lvl="1" indent="0">
+              <a:buNone/>
+            </a:pPr>
+            <a:endParaRPr lang="fr-FR" dirty="0" smtClean="0"/>
+          </a:p>
+          <a:p>
+            <a:pPr marL="0" indent="0">
+              <a:buNone/>
+            </a:pPr>
+            <a:r>
+              <a:rPr lang="fr-FR" sz="1900" b="1" dirty="0">
+                <a:solidFill>
+                  <a:schemeClr val="bg2">
+                    <a:lumMod val="50000"/>
+                  </a:schemeClr>
+                </a:solidFill>
+                <a:effectLst>
+                  <a:outerShdw blurRad="38100" dist="38100" dir="2700000" algn="tl">
+                    <a:srgbClr val="000000">
+                      <a:alpha val="43137"/>
+                    </a:srgbClr>
+                  </a:outerShdw>
+                </a:effectLst>
+              </a:rPr>
+              <a:t>C</a:t>
+            </a:r>
+            <a:r>
+              <a:rPr lang="fr-FR" sz="1900" b="1" dirty="0" smtClean="0">
+                <a:solidFill>
+                  <a:schemeClr val="accent1"/>
+                </a:solidFill>
+              </a:rPr>
+              <a:t>orrections </a:t>
+            </a:r>
+            <a:r>
+              <a:rPr lang="fr-FR" sz="1900" b="1" dirty="0">
+                <a:solidFill>
+                  <a:schemeClr val="accent1"/>
+                </a:solidFill>
+              </a:rPr>
+              <a:t>et bonnes pratiques du projets :</a:t>
+            </a:r>
+          </a:p>
+          <a:p>
+            <a:pPr lvl="1"/>
+            <a:r>
+              <a:rPr lang="fr-FR" sz="1700" dirty="0" smtClean="0">
+                <a:solidFill>
+                  <a:schemeClr val="bg2">
+                    <a:lumMod val="50000"/>
+                  </a:schemeClr>
+                </a:solidFill>
+              </a:rPr>
+              <a:t>Analyse du code avec </a:t>
+            </a:r>
+            <a:r>
+              <a:rPr lang="fr-FR" sz="1700" dirty="0" err="1" smtClean="0">
+                <a:solidFill>
+                  <a:schemeClr val="bg2">
+                    <a:lumMod val="50000"/>
+                  </a:schemeClr>
+                </a:solidFill>
+              </a:rPr>
+              <a:t>Codacy</a:t>
+            </a:r>
+            <a:r>
+              <a:rPr lang="fr-FR" sz="1700" dirty="0" smtClean="0">
+                <a:solidFill>
+                  <a:schemeClr val="bg2">
+                    <a:lumMod val="50000"/>
+                  </a:schemeClr>
+                </a:solidFill>
+              </a:rPr>
+              <a:t> Code.</a:t>
+            </a:r>
+            <a:endParaRPr lang="fr-FR" sz="1700" dirty="0" smtClean="0">
+              <a:solidFill>
+                <a:schemeClr val="bg2">
+                  <a:lumMod val="50000"/>
+                </a:schemeClr>
+              </a:solidFill>
+            </a:endParaRPr>
+          </a:p>
+          <a:p>
+            <a:pPr lvl="1"/>
+            <a:r>
+              <a:rPr lang="fr-FR" sz="1700" dirty="0" smtClean="0">
+                <a:solidFill>
+                  <a:schemeClr val="bg2">
+                    <a:lumMod val="50000"/>
+                  </a:schemeClr>
+                </a:solidFill>
+              </a:rPr>
+              <a:t>PSR-1 + PSR-2+ PSR-4.</a:t>
+            </a:r>
+            <a:endParaRPr lang="fr-FR" sz="1700" dirty="0" smtClean="0">
+              <a:solidFill>
+                <a:schemeClr val="bg2">
+                  <a:lumMod val="50000"/>
+                </a:schemeClr>
+              </a:solidFill>
+            </a:endParaRPr>
+          </a:p>
+          <a:p>
             <a:endParaRPr lang="fr-FR" dirty="0"/>
           </a:p>
         </p:txBody>
       </p:sp>
-      <p:sp>
-        <p:nvSpPr>
-          <p:cNvPr id="3" name="Espace réservé du contenu 2"/>
-          <p:cNvSpPr>
-            <a:spLocks noGrp="1"/>
-          </p:cNvSpPr>
-          <p:nvPr>
-            <p:ph idx="1"/>
-          </p:nvPr>
-        </p:nvSpPr>
-        <p:spPr/>
-        <p:txBody>
-          <a:bodyPr/>
-          <a:lstStyle/>
-          <a:p>
-            <a:r>
-              <a:rPr lang="fr-FR" dirty="0" smtClean="0"/>
-              <a:t> </a:t>
-            </a:r>
-            <a:r>
-              <a:rPr lang="fr-FR" dirty="0" err="1" smtClean="0"/>
-              <a:t>Versionnage</a:t>
-            </a:r>
-            <a:r>
-              <a:rPr lang="fr-FR" dirty="0" smtClean="0"/>
-              <a:t> du projet avec </a:t>
-            </a:r>
-            <a:r>
-              <a:rPr lang="fr-FR" dirty="0" err="1" smtClean="0"/>
-              <a:t>GitHub</a:t>
-            </a:r>
-            <a:r>
-              <a:rPr lang="fr-FR" dirty="0" smtClean="0"/>
-              <a:t> </a:t>
-            </a:r>
-          </a:p>
-          <a:p>
-            <a:r>
-              <a:rPr lang="fr-FR" dirty="0" smtClean="0"/>
-              <a:t>MVC </a:t>
-            </a:r>
-          </a:p>
-          <a:p>
-            <a:r>
-              <a:rPr lang="fr-FR" dirty="0" err="1" smtClean="0"/>
-              <a:t>Twig</a:t>
-            </a:r>
-            <a:endParaRPr lang="fr-FR" dirty="0" smtClean="0"/>
-          </a:p>
-          <a:p>
-            <a:r>
-              <a:rPr lang="fr-FR" dirty="0" smtClean="0"/>
-              <a:t>Pull </a:t>
-            </a:r>
-            <a:r>
-              <a:rPr lang="fr-FR" dirty="0" err="1" smtClean="0"/>
-              <a:t>Request</a:t>
-            </a:r>
-            <a:r>
-              <a:rPr lang="fr-FR" dirty="0" smtClean="0"/>
-              <a:t> tant</a:t>
-            </a:r>
-          </a:p>
-          <a:p>
-            <a:r>
-              <a:rPr lang="fr-FR" dirty="0" err="1" smtClean="0"/>
-              <a:t>Codacy</a:t>
-            </a:r>
-            <a:r>
-              <a:rPr lang="fr-FR" dirty="0" smtClean="0"/>
-              <a:t> Code</a:t>
-            </a:r>
-          </a:p>
-          <a:p>
-            <a:r>
-              <a:rPr lang="fr-FR" smtClean="0"/>
-              <a:t>Bonne pratiques</a:t>
-            </a:r>
-            <a:endParaRPr lang="fr-FR" dirty="0" smtClean="0"/>
-          </a:p>
-          <a:p>
-            <a:endParaRPr lang="fr-FR" dirty="0"/>
-          </a:p>
-        </p:txBody>
-      </p:sp>
+      <p:pic>
+        <p:nvPicPr>
+          <p:cNvPr id="4" name="Image 3"/>
+          <p:cNvPicPr>
+            <a:picLocks noChangeAspect="1"/>
+          </p:cNvPicPr>
+          <p:nvPr/>
+        </p:nvPicPr>
+        <p:blipFill>
+          <a:blip r:embed="rId2" cstate="print">
+            <a:extLst>
+              <a:ext uri="{28A0092B-C50C-407E-A947-70E740481C1C}">
+                <a14:useLocalDpi xmlns:a14="http://schemas.microsoft.com/office/drawing/2010/main" val="0"/>
+              </a:ext>
+            </a:extLst>
+          </a:blip>
+          <a:stretch>
+            <a:fillRect/>
+          </a:stretch>
+        </p:blipFill>
+        <p:spPr>
+          <a:xfrm>
+            <a:off x="5877729" y="1669727"/>
+            <a:ext cx="568221" cy="568221"/>
+          </a:xfrm>
+          <a:prstGeom prst="rect">
+            <a:avLst/>
+          </a:prstGeom>
+        </p:spPr>
+      </p:pic>
+      <p:pic>
+        <p:nvPicPr>
+          <p:cNvPr id="5" name="Image 4"/>
+          <p:cNvPicPr>
+            <a:picLocks noChangeAspect="1"/>
+          </p:cNvPicPr>
+          <p:nvPr/>
+        </p:nvPicPr>
+        <p:blipFill>
+          <a:blip r:embed="rId3" cstate="print">
+            <a:extLst>
+              <a:ext uri="{28A0092B-C50C-407E-A947-70E740481C1C}">
+                <a14:useLocalDpi xmlns:a14="http://schemas.microsoft.com/office/drawing/2010/main" val="0"/>
+              </a:ext>
+            </a:extLst>
+          </a:blip>
+          <a:stretch>
+            <a:fillRect/>
+          </a:stretch>
+        </p:blipFill>
+        <p:spPr>
+          <a:xfrm>
+            <a:off x="6161839" y="3594878"/>
+            <a:ext cx="949974" cy="591270"/>
+          </a:xfrm>
+          <a:prstGeom prst="rect">
+            <a:avLst/>
+          </a:prstGeom>
+        </p:spPr>
+      </p:pic>
+      <p:pic>
+        <p:nvPicPr>
+          <p:cNvPr id="6" name="Image 5"/>
+          <p:cNvPicPr>
+            <a:picLocks noChangeAspect="1"/>
+          </p:cNvPicPr>
+          <p:nvPr/>
+        </p:nvPicPr>
+        <p:blipFill>
+          <a:blip r:embed="rId4" cstate="print">
+            <a:extLst>
+              <a:ext uri="{28A0092B-C50C-407E-A947-70E740481C1C}">
+                <a14:useLocalDpi xmlns:a14="http://schemas.microsoft.com/office/drawing/2010/main" val="0"/>
+              </a:ext>
+            </a:extLst>
+          </a:blip>
+          <a:stretch>
+            <a:fillRect/>
+          </a:stretch>
+        </p:blipFill>
+        <p:spPr>
+          <a:xfrm>
+            <a:off x="5877729" y="5090909"/>
+            <a:ext cx="904337" cy="904337"/>
+          </a:xfrm>
+          <a:prstGeom prst="rect">
+            <a:avLst/>
+          </a:prstGeom>
+        </p:spPr>
+      </p:pic>
     </p:spTree>
     <p:extLst>
       <p:ext uri="{BB962C8B-B14F-4D97-AF65-F5344CB8AC3E}">

</xml_diff>